<commit_message>
update online install documents.
</commit_message>
<xml_diff>
--- a/asset/Learn_ja/OASE-online-install_ja.pptx
+++ b/asset/Learn_ja/OASE-online-install_ja.pptx
@@ -350,7 +350,7 @@
               <a:rPr kumimoji="1" lang="ja-JP" altLang="en-US" smtClean="0">
                 <a:ea typeface="メイリオ" panose="020B0604030504040204" pitchFamily="50" charset="-128"/>
               </a:rPr>
-              <a:t>2020/5/21</a:t>
+              <a:t>2020/5/29</a:t>
             </a:fld>
             <a:endParaRPr kumimoji="1" lang="ja-JP" altLang="en-US">
               <a:ea typeface="メイリオ" panose="020B0604030504040204" pitchFamily="50" charset="-128"/>
@@ -496,7 +496,7 @@
             <a:fld id="{4B26993D-C081-44EB-B0F5-A9F467792B62}" type="datetimeFigureOut">
               <a:rPr lang="ja-JP" altLang="en-US" smtClean="0"/>
               <a:pPr/>
-              <a:t>2020/5/21</a:t>
+              <a:t>2020/5/29</a:t>
             </a:fld>
             <a:endParaRPr lang="ja-JP" altLang="en-US"/>
           </a:p>
@@ -1100,7 +1100,7 @@
           <a:p>
             <a:fld id="{56F9016B-CCA6-43BE-8BEE-59565A35F4F7}" type="datetimeFigureOut">
               <a:rPr kumimoji="1" lang="ja-JP" altLang="en-US" smtClean="0"/>
-              <a:t>2020/5/21</a:t>
+              <a:t>2020/5/29</a:t>
             </a:fld>
             <a:endParaRPr kumimoji="1" lang="ja-JP" altLang="en-US"/>
           </a:p>
@@ -1300,7 +1300,7 @@
           <a:p>
             <a:fld id="{56F9016B-CCA6-43BE-8BEE-59565A35F4F7}" type="datetimeFigureOut">
               <a:rPr kumimoji="1" lang="ja-JP" altLang="en-US" smtClean="0"/>
-              <a:t>2020/5/21</a:t>
+              <a:t>2020/5/29</a:t>
             </a:fld>
             <a:endParaRPr kumimoji="1" lang="ja-JP" altLang="en-US"/>
           </a:p>
@@ -1545,7 +1545,7 @@
           <a:p>
             <a:fld id="{56F9016B-CCA6-43BE-8BEE-59565A35F4F7}" type="datetimeFigureOut">
               <a:rPr kumimoji="1" lang="ja-JP" altLang="en-US" smtClean="0"/>
-              <a:t>2020/5/21</a:t>
+              <a:t>2020/5/29</a:t>
             </a:fld>
             <a:endParaRPr kumimoji="1" lang="ja-JP" altLang="en-US"/>
           </a:p>
@@ -1838,7 +1838,7 @@
           <a:p>
             <a:fld id="{56F9016B-CCA6-43BE-8BEE-59565A35F4F7}" type="datetimeFigureOut">
               <a:rPr kumimoji="1" lang="ja-JP" altLang="en-US" smtClean="0"/>
-              <a:t>2020/5/21</a:t>
+              <a:t>2020/5/29</a:t>
             </a:fld>
             <a:endParaRPr kumimoji="1" lang="ja-JP" altLang="en-US"/>
           </a:p>
@@ -2266,7 +2266,7 @@
           <a:p>
             <a:fld id="{56F9016B-CCA6-43BE-8BEE-59565A35F4F7}" type="datetimeFigureOut">
               <a:rPr kumimoji="1" lang="ja-JP" altLang="en-US" smtClean="0"/>
-              <a:t>2020/5/21</a:t>
+              <a:t>2020/5/29</a:t>
             </a:fld>
             <a:endParaRPr kumimoji="1" lang="ja-JP" altLang="en-US"/>
           </a:p>
@@ -2383,7 +2383,7 @@
           <a:p>
             <a:fld id="{56F9016B-CCA6-43BE-8BEE-59565A35F4F7}" type="datetimeFigureOut">
               <a:rPr kumimoji="1" lang="ja-JP" altLang="en-US" smtClean="0"/>
-              <a:t>2020/5/21</a:t>
+              <a:t>2020/5/29</a:t>
             </a:fld>
             <a:endParaRPr kumimoji="1" lang="ja-JP" altLang="en-US"/>
           </a:p>
@@ -2478,7 +2478,7 @@
           <a:p>
             <a:fld id="{56F9016B-CCA6-43BE-8BEE-59565A35F4F7}" type="datetimeFigureOut">
               <a:rPr kumimoji="1" lang="ja-JP" altLang="en-US" smtClean="0"/>
-              <a:t>2020/5/21</a:t>
+              <a:t>2020/5/29</a:t>
             </a:fld>
             <a:endParaRPr kumimoji="1" lang="ja-JP" altLang="en-US"/>
           </a:p>
@@ -2785,7 +2785,7 @@
           <a:p>
             <a:fld id="{56F9016B-CCA6-43BE-8BEE-59565A35F4F7}" type="datetimeFigureOut">
               <a:rPr kumimoji="1" lang="ja-JP" altLang="en-US" smtClean="0"/>
-              <a:t>2020/5/21</a:t>
+              <a:t>2020/5/29</a:t>
             </a:fld>
             <a:endParaRPr kumimoji="1" lang="ja-JP" altLang="en-US"/>
           </a:p>
@@ -3037,7 +3037,7 @@
           <a:p>
             <a:fld id="{56F9016B-CCA6-43BE-8BEE-59565A35F4F7}" type="datetimeFigureOut">
               <a:rPr kumimoji="1" lang="ja-JP" altLang="en-US" smtClean="0"/>
-              <a:t>2020/5/21</a:t>
+              <a:t>2020/5/29</a:t>
             </a:fld>
             <a:endParaRPr kumimoji="1" lang="ja-JP" altLang="en-US"/>
           </a:p>
@@ -3304,7 +3304,7 @@
           <a:p>
             <a:fld id="{56F9016B-CCA6-43BE-8BEE-59565A35F4F7}" type="datetimeFigureOut">
               <a:rPr kumimoji="1" lang="ja-JP" altLang="en-US" smtClean="0"/>
-              <a:t>2020/5/21</a:t>
+              <a:t>2020/5/29</a:t>
             </a:fld>
             <a:endParaRPr kumimoji="1" lang="ja-JP" altLang="en-US"/>
           </a:p>
@@ -3514,7 +3514,7 @@
           <a:p>
             <a:fld id="{56F9016B-CCA6-43BE-8BEE-59565A35F4F7}" type="datetimeFigureOut">
               <a:rPr kumimoji="1" lang="ja-JP" altLang="en-US" smtClean="0"/>
-              <a:t>2020/5/21</a:t>
+              <a:t>2020/5/29</a:t>
             </a:fld>
             <a:endParaRPr kumimoji="1" lang="ja-JP" altLang="en-US"/>
           </a:p>
@@ -6506,7 +6506,7 @@
           <a:p>
             <a:fld id="{56F9016B-CCA6-43BE-8BEE-59565A35F4F7}" type="datetimeFigureOut">
               <a:rPr kumimoji="1" lang="ja-JP" altLang="en-US" smtClean="0"/>
-              <a:t>2020/5/21</a:t>
+              <a:t>2020/5/29</a:t>
             </a:fld>
             <a:endParaRPr kumimoji="1" lang="ja-JP" altLang="en-US"/>
           </a:p>
@@ -6972,8 +6972,8 @@
         </p:nvSpPr>
         <p:spPr bwMode="gray">
           <a:xfrm>
-            <a:off x="0" y="1816796"/>
-            <a:ext cx="9143999" cy="2252343"/>
+            <a:off x="0" y="3417234"/>
+            <a:ext cx="9143999" cy="651905"/>
           </a:xfrm>
           <a:prstGeom prst="rect">
             <a:avLst/>
@@ -7124,31 +7124,10 @@
           </a:lstStyle>
           <a:p>
             <a:r>
-              <a:rPr lang="en-US" altLang="ja-JP" sz="4800" b="1"/>
-              <a:t>Operation</a:t>
-            </a:r>
-            <a:r>
-              <a:rPr lang="en-US" altLang="ja-JP" sz="4800" b="1" kern="0">
-                <a:solidFill>
-                  <a:schemeClr val="tx2">
-                    <a:lumMod val="75000"/>
-                    <a:lumOff val="25000"/>
-                  </a:schemeClr>
-                </a:solidFill>
-              </a:rPr>
-              <a:t> </a:t>
-            </a:r>
-            <a:r>
-              <a:rPr lang="en-US" altLang="ja-JP" sz="4800" b="1"/>
-              <a:t>Autonomy Support Engine</a:t>
-            </a:r>
-          </a:p>
-          <a:p>
-            <a:r>
-              <a:rPr lang="ja-JP" altLang="en-US" sz="4800" b="1"/>
+              <a:rPr lang="ja-JP" altLang="en-US" sz="4000" b="1" smtClean="0"/>
               <a:t>オンラインインストール</a:t>
             </a:r>
-            <a:endParaRPr lang="en-US" altLang="ja-JP" sz="4800" b="1" kern="0" spc="-150">
+            <a:endParaRPr lang="en-US" altLang="ja-JP" sz="4000" b="1" kern="0" spc="-150">
               <a:solidFill>
                 <a:schemeClr val="tx2">
                   <a:lumMod val="75000"/>
@@ -7420,6 +7399,36 @@
           <a:xfrm>
             <a:off x="251400" y="247474"/>
             <a:ext cx="3528490" cy="826990"/>
+          </a:xfrm>
+          <a:prstGeom prst="rect">
+            <a:avLst/>
+          </a:prstGeom>
+        </p:spPr>
+      </p:pic>
+      <p:pic>
+        <p:nvPicPr>
+          <p:cNvPr id="2" name="図 1"/>
+          <p:cNvPicPr>
+            <a:picLocks noChangeAspect="1"/>
+          </p:cNvPicPr>
+          <p:nvPr/>
+        </p:nvPicPr>
+        <p:blipFill>
+          <a:blip r:embed="rId3">
+            <a:extLst>
+              <a:ext uri="{28A0092B-C50C-407E-A947-70E740481C1C}">
+                <a14:useLocalDpi xmlns:a14="http://schemas.microsoft.com/office/drawing/2010/main" val="0"/>
+              </a:ext>
+            </a:extLst>
+          </a:blip>
+          <a:stretch>
+            <a:fillRect/>
+          </a:stretch>
+        </p:blipFill>
+        <p:spPr>
+          <a:xfrm>
+            <a:off x="914399" y="2157398"/>
+            <a:ext cx="7315200" cy="1095375"/>
           </a:xfrm>
           <a:prstGeom prst="rect">
             <a:avLst/>
@@ -18445,11 +18454,7 @@
             </a:pPr>
             <a:r>
               <a:rPr lang="ja-JP" altLang="en-US"/>
-              <a:t>　②　</a:t>
-            </a:r>
-            <a:r>
-              <a:rPr lang="ja-JP" altLang="en-US"/>
-              <a:t>プライバシ</a:t>
+              <a:t>　②　プライバシ</a:t>
             </a:r>
             <a:r>
               <a:rPr lang="ja-JP" altLang="en-US" smtClean="0"/>
@@ -18503,11 +18508,7 @@
             </a:r>
             <a:r>
               <a:rPr lang="ja-JP" altLang="en-US" smtClean="0"/>
-              <a:t>　　</a:t>
-            </a:r>
-            <a:r>
-              <a:rPr lang="ja-JP" altLang="en-US" smtClean="0"/>
-              <a:t>理</a:t>
+              <a:t>　　理</a:t>
             </a:r>
             <a:r>
               <a:rPr lang="en-US" altLang="ja-JP"/>

</xml_diff>